<commit_message>
readme and input-output files updated with zenodo link
</commit_message>
<xml_diff>
--- a/archived/20221123_folder_script_structure.pptx
+++ b/archived/20221123_folder_script_structure.pptx
@@ -16394,7 +16394,7 @@
         </p:nvSpPr>
         <p:spPr>
           <a:xfrm>
-            <a:off x="-381504" y="1992341"/>
+            <a:off x="-381504" y="1272815"/>
             <a:ext cx="13828425" cy="4581289"/>
           </a:xfrm>
           <a:prstGeom prst="rect">
@@ -16562,7 +16562,7 @@
         </p:nvSpPr>
         <p:spPr>
           <a:xfrm>
-            <a:off x="1034416" y="2420913"/>
+            <a:off x="1034416" y="1701387"/>
             <a:ext cx="1842704" cy="2321799"/>
           </a:xfrm>
           <a:prstGeom prst="rect">
@@ -16652,7 +16652,7 @@
         </p:nvSpPr>
         <p:spPr>
           <a:xfrm>
-            <a:off x="3254764" y="2420912"/>
+            <a:off x="3254764" y="1701386"/>
             <a:ext cx="2743200" cy="274320"/>
           </a:xfrm>
           <a:prstGeom prst="rect">
@@ -16716,7 +16716,7 @@
         </p:nvSpPr>
         <p:spPr>
           <a:xfrm>
-            <a:off x="3254764" y="3155190"/>
+            <a:off x="3254764" y="2435664"/>
             <a:ext cx="2743200" cy="919465"/>
           </a:xfrm>
           <a:prstGeom prst="rect">
@@ -16805,7 +16805,7 @@
         </p:nvSpPr>
         <p:spPr>
           <a:xfrm>
-            <a:off x="3254764" y="4156164"/>
+            <a:off x="3254764" y="3436638"/>
             <a:ext cx="2743200" cy="690808"/>
           </a:xfrm>
           <a:prstGeom prst="rect">
@@ -16878,7 +16878,7 @@
         </p:nvSpPr>
         <p:spPr>
           <a:xfrm>
-            <a:off x="9059933" y="3283604"/>
+            <a:off x="9059933" y="2564078"/>
             <a:ext cx="2193250" cy="601921"/>
           </a:xfrm>
           <a:prstGeom prst="rect">
@@ -16934,7 +16934,7 @@
         </p:nvSpPr>
         <p:spPr>
           <a:xfrm>
-            <a:off x="3254764" y="2786976"/>
+            <a:off x="3254764" y="2067450"/>
             <a:ext cx="2743200" cy="274320"/>
           </a:xfrm>
           <a:prstGeom prst="rect">
@@ -16998,7 +16998,7 @@
         </p:nvSpPr>
         <p:spPr>
           <a:xfrm>
-            <a:off x="6362798" y="3577363"/>
+            <a:off x="6362798" y="2857837"/>
             <a:ext cx="2188030" cy="274320"/>
           </a:xfrm>
           <a:prstGeom prst="rect">
@@ -17054,7 +17054,7 @@
         </p:nvSpPr>
         <p:spPr>
           <a:xfrm>
-            <a:off x="11605034" y="3227411"/>
+            <a:off x="11605034" y="2507885"/>
             <a:ext cx="1753092" cy="274320"/>
           </a:xfrm>
           <a:prstGeom prst="rect">
@@ -17110,7 +17110,7 @@
         </p:nvSpPr>
         <p:spPr>
           <a:xfrm>
-            <a:off x="6362798" y="2420912"/>
+            <a:off x="6362798" y="1701386"/>
             <a:ext cx="2184359" cy="274320"/>
           </a:xfrm>
           <a:prstGeom prst="rect">
@@ -17166,7 +17166,7 @@
         </p:nvSpPr>
         <p:spPr>
           <a:xfrm>
-            <a:off x="11597540" y="3582294"/>
+            <a:off x="11597540" y="2862768"/>
             <a:ext cx="1753092" cy="274320"/>
           </a:xfrm>
           <a:prstGeom prst="rect">
@@ -17222,7 +17222,7 @@
         </p:nvSpPr>
         <p:spPr>
           <a:xfrm>
-            <a:off x="6362798" y="4151494"/>
+            <a:off x="6362798" y="3431968"/>
             <a:ext cx="2219268" cy="690805"/>
           </a:xfrm>
           <a:prstGeom prst="rect">
@@ -17297,7 +17297,7 @@
         </p:nvSpPr>
         <p:spPr>
           <a:xfrm>
-            <a:off x="2775481" y="2173361"/>
+            <a:off x="2775481" y="1453835"/>
             <a:ext cx="627797" cy="239417"/>
           </a:xfrm>
           <a:prstGeom prst="rect">
@@ -17350,7 +17350,7 @@
         </p:nvCxnSpPr>
         <p:spPr>
           <a:xfrm>
-            <a:off x="2906540" y="2561799"/>
+            <a:off x="2906540" y="1842273"/>
             <a:ext cx="286187" cy="0"/>
           </a:xfrm>
           <a:prstGeom prst="straightConnector1">
@@ -17391,7 +17391,7 @@
         </p:nvCxnSpPr>
         <p:spPr>
           <a:xfrm>
-            <a:off x="2906540" y="2894079"/>
+            <a:off x="2906540" y="2174553"/>
             <a:ext cx="286187" cy="0"/>
           </a:xfrm>
           <a:prstGeom prst="straightConnector1">
@@ -17432,7 +17432,7 @@
         </p:nvCxnSpPr>
         <p:spPr>
           <a:xfrm>
-            <a:off x="2906540" y="3601109"/>
+            <a:off x="2906540" y="2881583"/>
             <a:ext cx="286187" cy="0"/>
           </a:xfrm>
           <a:prstGeom prst="straightConnector1">
@@ -17473,7 +17473,7 @@
         </p:nvCxnSpPr>
         <p:spPr>
           <a:xfrm>
-            <a:off x="2906540" y="4488022"/>
+            <a:off x="2906540" y="3768496"/>
             <a:ext cx="286187" cy="0"/>
           </a:xfrm>
           <a:prstGeom prst="straightConnector1">
@@ -17512,7 +17512,7 @@
         </p:nvSpPr>
         <p:spPr>
           <a:xfrm>
-            <a:off x="5914359" y="2173361"/>
+            <a:off x="5914359" y="1453835"/>
             <a:ext cx="570725" cy="239417"/>
           </a:xfrm>
           <a:prstGeom prst="rect">
@@ -17563,7 +17563,7 @@
         </p:nvSpPr>
         <p:spPr>
           <a:xfrm>
-            <a:off x="5933409" y="3047062"/>
+            <a:off x="5933409" y="2327536"/>
             <a:ext cx="1751850" cy="289695"/>
           </a:xfrm>
           <a:prstGeom prst="rect">
@@ -17616,7 +17616,7 @@
         </p:nvCxnSpPr>
         <p:spPr>
           <a:xfrm>
-            <a:off x="6030318" y="2542948"/>
+            <a:off x="6030318" y="1823422"/>
             <a:ext cx="286187" cy="0"/>
           </a:xfrm>
           <a:prstGeom prst="straightConnector1">
@@ -17657,7 +17657,7 @@
         </p:nvCxnSpPr>
         <p:spPr>
           <a:xfrm>
-            <a:off x="6030318" y="3729123"/>
+            <a:off x="6030318" y="3009597"/>
             <a:ext cx="286187" cy="0"/>
           </a:xfrm>
           <a:prstGeom prst="straightConnector1">
@@ -17698,7 +17698,7 @@
         </p:nvCxnSpPr>
         <p:spPr>
           <a:xfrm>
-            <a:off x="6030318" y="4484161"/>
+            <a:off x="6030318" y="3764635"/>
             <a:ext cx="286187" cy="0"/>
           </a:xfrm>
           <a:prstGeom prst="straightConnector1">
@@ -17739,7 +17739,7 @@
         </p:nvCxnSpPr>
         <p:spPr>
           <a:xfrm>
-            <a:off x="6030318" y="3359027"/>
+            <a:off x="6030318" y="2639501"/>
             <a:ext cx="2954656" cy="0"/>
           </a:xfrm>
           <a:prstGeom prst="straightConnector1">
@@ -17778,7 +17778,7 @@
         </p:nvSpPr>
         <p:spPr>
           <a:xfrm>
-            <a:off x="11121888" y="2984407"/>
+            <a:off x="11121888" y="2264881"/>
             <a:ext cx="570725" cy="239417"/>
           </a:xfrm>
           <a:prstGeom prst="rect">
@@ -17831,7 +17831,7 @@
         </p:nvCxnSpPr>
         <p:spPr>
           <a:xfrm>
-            <a:off x="11273683" y="3398574"/>
+            <a:off x="11273683" y="2679048"/>
             <a:ext cx="286187" cy="0"/>
           </a:xfrm>
           <a:prstGeom prst="straightConnector1">
@@ -17872,7 +17872,7 @@
         </p:nvCxnSpPr>
         <p:spPr>
           <a:xfrm>
-            <a:off x="11273683" y="3698559"/>
+            <a:off x="11273683" y="2979033"/>
             <a:ext cx="286187" cy="0"/>
           </a:xfrm>
           <a:prstGeom prst="straightConnector1">
@@ -17911,7 +17911,7 @@
         </p:nvSpPr>
         <p:spPr>
           <a:xfrm>
-            <a:off x="-304513" y="2904318"/>
+            <a:off x="-304513" y="2184792"/>
             <a:ext cx="1124146" cy="406137"/>
           </a:xfrm>
           <a:prstGeom prst="rect">
@@ -17964,7 +17964,7 @@
         </p:nvCxnSpPr>
         <p:spPr>
           <a:xfrm flipH="1">
-            <a:off x="683449" y="3501731"/>
+            <a:off x="683449" y="2782205"/>
             <a:ext cx="286187" cy="0"/>
           </a:xfrm>
           <a:prstGeom prst="straightConnector1">
@@ -18003,7 +18003,7 @@
         </p:nvSpPr>
         <p:spPr>
           <a:xfrm>
-            <a:off x="-219229" y="3367304"/>
+            <a:off x="-219229" y="2647778"/>
             <a:ext cx="874068" cy="274320"/>
           </a:xfrm>
           <a:prstGeom prst="rect">
@@ -18058,7 +18058,7 @@
         </p:nvSpPr>
         <p:spPr>
           <a:xfrm>
-            <a:off x="-58186" y="5243003"/>
+            <a:off x="-58186" y="4523477"/>
             <a:ext cx="842165" cy="274320"/>
           </a:xfrm>
           <a:prstGeom prst="rect">
@@ -18113,7 +18113,7 @@
         </p:nvSpPr>
         <p:spPr>
           <a:xfrm>
-            <a:off x="-58187" y="5606801"/>
+            <a:off x="-58187" y="4887275"/>
             <a:ext cx="842165" cy="274320"/>
           </a:xfrm>
           <a:prstGeom prst="rect">
@@ -18173,7 +18173,7 @@
         </p:nvSpPr>
         <p:spPr>
           <a:xfrm>
-            <a:off x="-58188" y="5970599"/>
+            <a:off x="-58188" y="5251073"/>
             <a:ext cx="842165" cy="274320"/>
           </a:xfrm>
           <a:prstGeom prst="rect">
@@ -18228,7 +18228,7 @@
         </p:nvSpPr>
         <p:spPr>
           <a:xfrm>
-            <a:off x="762512" y="5627347"/>
+            <a:off x="762512" y="4907821"/>
             <a:ext cx="8811794" cy="252178"/>
           </a:xfrm>
           <a:prstGeom prst="rect">
@@ -18278,7 +18278,7 @@
         </p:nvSpPr>
         <p:spPr>
           <a:xfrm>
-            <a:off x="783977" y="5993477"/>
+            <a:off x="783977" y="5273951"/>
             <a:ext cx="10004406" cy="252178"/>
           </a:xfrm>
           <a:prstGeom prst="rect">
@@ -18328,7 +18328,7 @@
         </p:nvSpPr>
         <p:spPr>
           <a:xfrm>
-            <a:off x="8506940" y="3475106"/>
+            <a:off x="8506940" y="2755580"/>
             <a:ext cx="570725" cy="239417"/>
           </a:xfrm>
           <a:prstGeom prst="rect">
@@ -18381,7 +18381,7 @@
         </p:nvCxnSpPr>
         <p:spPr>
           <a:xfrm>
-            <a:off x="8635060" y="3760927"/>
+            <a:off x="8635060" y="3041401"/>
             <a:ext cx="346287" cy="0"/>
           </a:xfrm>
           <a:prstGeom prst="straightConnector1">
@@ -20411,6 +20411,1864 @@
           </a:p>
         </p:txBody>
       </p:sp>
+      <p:sp>
+        <p:nvSpPr>
+          <p:cNvPr id="52" name="Rectangle 51">
+            <a:extLst>
+              <a:ext uri="{FF2B5EF4-FFF2-40B4-BE49-F238E27FC236}">
+                <a16:creationId xmlns:a16="http://schemas.microsoft.com/office/drawing/2014/main" id="{250418CC-FC2C-447B-AE92-DB560B6B2BFD}"/>
+              </a:ext>
+            </a:extLst>
+          </p:cNvPr>
+          <p:cNvSpPr/>
+          <p:nvPr/>
+        </p:nvSpPr>
+        <p:spPr>
+          <a:xfrm>
+            <a:off x="1034416" y="1701387"/>
+            <a:ext cx="1842704" cy="2321799"/>
+          </a:xfrm>
+          <a:prstGeom prst="rect">
+            <a:avLst/>
+          </a:prstGeom>
+          <a:solidFill>
+            <a:schemeClr val="accent1">
+              <a:lumMod val="20000"/>
+              <a:lumOff val="80000"/>
+            </a:schemeClr>
+          </a:solidFill>
+          <a:ln>
+            <a:noFill/>
+          </a:ln>
+        </p:spPr>
+        <p:style>
+          <a:lnRef idx="3">
+            <a:schemeClr val="lt1"/>
+          </a:lnRef>
+          <a:fillRef idx="1">
+            <a:schemeClr val="accent3"/>
+          </a:fillRef>
+          <a:effectRef idx="1">
+            <a:schemeClr val="accent3"/>
+          </a:effectRef>
+          <a:fontRef idx="minor">
+            <a:schemeClr val="lt1"/>
+          </a:fontRef>
+        </p:style>
+        <p:txBody>
+          <a:bodyPr rtlCol="0" anchor="ctr"/>
+          <a:lstStyle/>
+          <a:p>
+            <a:r>
+              <a:rPr lang="en-US" sz="1400" dirty="0" err="1">
+                <a:solidFill>
+                  <a:sysClr val="windowText" lastClr="000000"/>
+                </a:solidFill>
+              </a:rPr>
+              <a:t>calculate_impacts.R</a:t>
+            </a:r>
+            <a:r>
+              <a:rPr lang="en-US" sz="1400" dirty="0">
+                <a:solidFill>
+                  <a:sysClr val="windowText" lastClr="000000"/>
+                </a:solidFill>
+              </a:rPr>
+              <a:t>, </a:t>
+            </a:r>
+          </a:p>
+          <a:p>
+            <a:r>
+              <a:rPr lang="en-US" sz="1400" dirty="0">
+                <a:solidFill>
+                  <a:sysClr val="windowText" lastClr="000000"/>
+                </a:solidFill>
+              </a:rPr>
+              <a:t>called in </a:t>
+            </a:r>
+            <a:r>
+              <a:rPr lang="en-US" sz="1400" dirty="0" err="1">
+                <a:solidFill>
+                  <a:sysClr val="windowText" lastClr="000000"/>
+                </a:solidFill>
+              </a:rPr>
+              <a:t>main.R</a:t>
+            </a:r>
+            <a:endParaRPr lang="en-US" sz="1400" dirty="0">
+              <a:solidFill>
+                <a:sysClr val="windowText" lastClr="000000"/>
+              </a:solidFill>
+            </a:endParaRPr>
+          </a:p>
+        </p:txBody>
+      </p:sp>
+      <p:sp>
+        <p:nvSpPr>
+          <p:cNvPr id="53" name="Rectangle 52">
+            <a:extLst>
+              <a:ext uri="{FF2B5EF4-FFF2-40B4-BE49-F238E27FC236}">
+                <a16:creationId xmlns:a16="http://schemas.microsoft.com/office/drawing/2014/main" id="{47000BA9-87BB-42AC-919A-C07AB6EEE326}"/>
+              </a:ext>
+            </a:extLst>
+          </p:cNvPr>
+          <p:cNvSpPr/>
+          <p:nvPr/>
+        </p:nvSpPr>
+        <p:spPr>
+          <a:xfrm>
+            <a:off x="3254764" y="1701386"/>
+            <a:ext cx="2743200" cy="274320"/>
+          </a:xfrm>
+          <a:prstGeom prst="rect">
+            <a:avLst/>
+          </a:prstGeom>
+          <a:solidFill>
+            <a:schemeClr val="accent1">
+              <a:lumMod val="20000"/>
+              <a:lumOff val="80000"/>
+            </a:schemeClr>
+          </a:solidFill>
+          <a:ln>
+            <a:noFill/>
+          </a:ln>
+        </p:spPr>
+        <p:style>
+          <a:lnRef idx="3">
+            <a:schemeClr val="lt1"/>
+          </a:lnRef>
+          <a:fillRef idx="1">
+            <a:schemeClr val="accent3"/>
+          </a:fillRef>
+          <a:effectRef idx="1">
+            <a:schemeClr val="accent3"/>
+          </a:effectRef>
+          <a:fontRef idx="minor">
+            <a:schemeClr val="lt1"/>
+          </a:fontRef>
+        </p:style>
+        <p:txBody>
+          <a:bodyPr rtlCol="0" anchor="ctr"/>
+          <a:lstStyle/>
+          <a:p>
+            <a:r>
+              <a:rPr lang="en-US" sz="1400" dirty="0" err="1">
+                <a:solidFill>
+                  <a:sysClr val="windowText" lastClr="000000"/>
+                </a:solidFill>
+              </a:rPr>
+              <a:t>calculate_slost.R</a:t>
+            </a:r>
+            <a:endParaRPr lang="en-US" sz="1400" dirty="0">
+              <a:solidFill>
+                <a:sysClr val="windowText" lastClr="000000"/>
+              </a:solidFill>
+            </a:endParaRPr>
+          </a:p>
+        </p:txBody>
+      </p:sp>
+      <p:sp>
+        <p:nvSpPr>
+          <p:cNvPr id="54" name="Rectangle 53">
+            <a:extLst>
+              <a:ext uri="{FF2B5EF4-FFF2-40B4-BE49-F238E27FC236}">
+                <a16:creationId xmlns:a16="http://schemas.microsoft.com/office/drawing/2014/main" id="{28C2EE00-BE0A-41E8-9AD8-0CAC122D83B1}"/>
+              </a:ext>
+            </a:extLst>
+          </p:cNvPr>
+          <p:cNvSpPr/>
+          <p:nvPr/>
+        </p:nvSpPr>
+        <p:spPr>
+          <a:xfrm>
+            <a:off x="3254764" y="2435664"/>
+            <a:ext cx="2743200" cy="919465"/>
+          </a:xfrm>
+          <a:prstGeom prst="rect">
+            <a:avLst/>
+          </a:prstGeom>
+          <a:solidFill>
+            <a:schemeClr val="accent5">
+              <a:lumMod val="20000"/>
+              <a:lumOff val="80000"/>
+            </a:schemeClr>
+          </a:solidFill>
+          <a:ln>
+            <a:noFill/>
+          </a:ln>
+        </p:spPr>
+        <p:style>
+          <a:lnRef idx="2">
+            <a:schemeClr val="dk1"/>
+          </a:lnRef>
+          <a:fillRef idx="1">
+            <a:schemeClr val="lt1"/>
+          </a:fillRef>
+          <a:effectRef idx="0">
+            <a:schemeClr val="dk1"/>
+          </a:effectRef>
+          <a:fontRef idx="minor">
+            <a:schemeClr val="dk1"/>
+          </a:fontRef>
+        </p:style>
+        <p:txBody>
+          <a:bodyPr rtlCol="0" anchor="ctr"/>
+          <a:lstStyle/>
+          <a:p>
+            <a:r>
+              <a:rPr lang="en-US" sz="1400" dirty="0"/>
+              <a:t>.</a:t>
+            </a:r>
+            <a:r>
+              <a:rPr lang="en-US" sz="1400" dirty="0" err="1"/>
+              <a:t>Rdata</a:t>
+            </a:r>
+            <a:r>
+              <a:rPr lang="en-US" sz="1400" dirty="0"/>
+              <a:t> files in data/</a:t>
+            </a:r>
+            <a:r>
+              <a:rPr lang="en-US" sz="1400" dirty="0" err="1"/>
+              <a:t>model_parameters</a:t>
+            </a:r>
+            <a:r>
+              <a:rPr lang="en-US" sz="1400" dirty="0"/>
+              <a:t>/</a:t>
+            </a:r>
+          </a:p>
+          <a:p>
+            <a:r>
+              <a:rPr lang="en-US" sz="1400" dirty="0" err="1"/>
+              <a:t>ecoregions_data</a:t>
+            </a:r>
+            <a:r>
+              <a:rPr lang="en-US" sz="1400" dirty="0"/>
+              <a:t>/</a:t>
+            </a:r>
+            <a:r>
+              <a:rPr lang="en-US" sz="1400" dirty="0" err="1"/>
+              <a:t>rr_zz</a:t>
+            </a:r>
+            <a:r>
+              <a:rPr lang="en-US" sz="1400" dirty="0"/>
+              <a:t>/ selected according to the initial settings</a:t>
+            </a:r>
+          </a:p>
+        </p:txBody>
+      </p:sp>
+      <p:sp>
+        <p:nvSpPr>
+          <p:cNvPr id="55" name="Rectangle 54">
+            <a:extLst>
+              <a:ext uri="{FF2B5EF4-FFF2-40B4-BE49-F238E27FC236}">
+                <a16:creationId xmlns:a16="http://schemas.microsoft.com/office/drawing/2014/main" id="{5A1ADD11-0818-4E09-AE47-742F733BE7CF}"/>
+              </a:ext>
+            </a:extLst>
+          </p:cNvPr>
+          <p:cNvSpPr/>
+          <p:nvPr/>
+        </p:nvSpPr>
+        <p:spPr>
+          <a:xfrm>
+            <a:off x="3254764" y="3436638"/>
+            <a:ext cx="2743200" cy="690808"/>
+          </a:xfrm>
+          <a:prstGeom prst="rect">
+            <a:avLst/>
+          </a:prstGeom>
+          <a:solidFill>
+            <a:schemeClr val="accent4">
+              <a:lumMod val="20000"/>
+              <a:lumOff val="80000"/>
+            </a:schemeClr>
+          </a:solidFill>
+          <a:ln>
+            <a:noFill/>
+          </a:ln>
+        </p:spPr>
+        <p:style>
+          <a:lnRef idx="2">
+            <a:schemeClr val="dk1"/>
+          </a:lnRef>
+          <a:fillRef idx="1">
+            <a:schemeClr val="lt1"/>
+          </a:fillRef>
+          <a:effectRef idx="0">
+            <a:schemeClr val="dk1"/>
+          </a:effectRef>
+          <a:fontRef idx="minor">
+            <a:schemeClr val="dk1"/>
+          </a:fontRef>
+        </p:style>
+        <p:txBody>
+          <a:bodyPr rtlCol="0" anchor="ctr"/>
+          <a:lstStyle/>
+          <a:p>
+            <a:r>
+              <a:rPr lang="en-US" sz="1400" dirty="0"/>
+              <a:t>.csv files in data/</a:t>
+            </a:r>
+            <a:r>
+              <a:rPr lang="en-US" sz="1400" dirty="0" err="1"/>
+              <a:t>land_use_data</a:t>
+            </a:r>
+            <a:r>
+              <a:rPr lang="en-US" sz="1400" dirty="0"/>
+              <a:t>/</a:t>
+            </a:r>
+          </a:p>
+          <a:p>
+            <a:r>
+              <a:rPr lang="en-US" sz="1400" dirty="0" err="1"/>
+              <a:t>areas_processed</a:t>
+            </a:r>
+            <a:r>
+              <a:rPr lang="en-US" sz="1400" dirty="0"/>
+              <a:t>/ selected according to the initial settings</a:t>
+            </a:r>
+          </a:p>
+        </p:txBody>
+      </p:sp>
+      <p:sp>
+        <p:nvSpPr>
+          <p:cNvPr id="56" name="Rectangle 55">
+            <a:extLst>
+              <a:ext uri="{FF2B5EF4-FFF2-40B4-BE49-F238E27FC236}">
+                <a16:creationId xmlns:a16="http://schemas.microsoft.com/office/drawing/2014/main" id="{35C22F18-6C04-44B1-B794-0D7A69DA5D1D}"/>
+              </a:ext>
+            </a:extLst>
+          </p:cNvPr>
+          <p:cNvSpPr/>
+          <p:nvPr/>
+        </p:nvSpPr>
+        <p:spPr>
+          <a:xfrm>
+            <a:off x="9059933" y="2564078"/>
+            <a:ext cx="2193250" cy="601921"/>
+          </a:xfrm>
+          <a:prstGeom prst="rect">
+            <a:avLst/>
+          </a:prstGeom>
+          <a:solidFill>
+            <a:schemeClr val="accent1">
+              <a:lumMod val="20000"/>
+              <a:lumOff val="80000"/>
+            </a:schemeClr>
+          </a:solidFill>
+          <a:ln>
+            <a:noFill/>
+          </a:ln>
+        </p:spPr>
+        <p:style>
+          <a:lnRef idx="2">
+            <a:schemeClr val="dk1"/>
+          </a:lnRef>
+          <a:fillRef idx="1">
+            <a:schemeClr val="lt1"/>
+          </a:fillRef>
+          <a:effectRef idx="0">
+            <a:schemeClr val="dk1"/>
+          </a:effectRef>
+          <a:fontRef idx="minor">
+            <a:schemeClr val="dk1"/>
+          </a:fontRef>
+        </p:style>
+        <p:txBody>
+          <a:bodyPr rtlCol="0" anchor="ctr"/>
+          <a:lstStyle/>
+          <a:p>
+            <a:r>
+              <a:rPr lang="en-US" sz="1400" dirty="0" err="1"/>
+              <a:t>parameters_calculation.R</a:t>
+            </a:r>
+            <a:endParaRPr lang="en-US" sz="1400" dirty="0"/>
+          </a:p>
+        </p:txBody>
+      </p:sp>
+      <p:sp>
+        <p:nvSpPr>
+          <p:cNvPr id="57" name="Rectangle 56">
+            <a:extLst>
+              <a:ext uri="{FF2B5EF4-FFF2-40B4-BE49-F238E27FC236}">
+                <a16:creationId xmlns:a16="http://schemas.microsoft.com/office/drawing/2014/main" id="{13764613-6270-47F9-987B-B72BB3A9D936}"/>
+              </a:ext>
+            </a:extLst>
+          </p:cNvPr>
+          <p:cNvSpPr/>
+          <p:nvPr/>
+        </p:nvSpPr>
+        <p:spPr>
+          <a:xfrm>
+            <a:off x="3254764" y="2067450"/>
+            <a:ext cx="2743200" cy="274320"/>
+          </a:xfrm>
+          <a:prstGeom prst="rect">
+            <a:avLst/>
+          </a:prstGeom>
+          <a:solidFill>
+            <a:schemeClr val="accent1">
+              <a:lumMod val="20000"/>
+              <a:lumOff val="80000"/>
+            </a:schemeClr>
+          </a:solidFill>
+          <a:ln>
+            <a:noFill/>
+          </a:ln>
+        </p:spPr>
+        <p:style>
+          <a:lnRef idx="3">
+            <a:schemeClr val="lt1"/>
+          </a:lnRef>
+          <a:fillRef idx="1">
+            <a:schemeClr val="accent3"/>
+          </a:fillRef>
+          <a:effectRef idx="1">
+            <a:schemeClr val="accent3"/>
+          </a:effectRef>
+          <a:fontRef idx="minor">
+            <a:schemeClr val="lt1"/>
+          </a:fontRef>
+        </p:style>
+        <p:txBody>
+          <a:bodyPr rtlCol="0" anchor="ctr"/>
+          <a:lstStyle/>
+          <a:p>
+            <a:r>
+              <a:rPr lang="en-US" sz="1400" dirty="0" err="1">
+                <a:solidFill>
+                  <a:sysClr val="windowText" lastClr="000000"/>
+                </a:solidFill>
+              </a:rPr>
+              <a:t>allocate_impacts.R</a:t>
+            </a:r>
+            <a:endParaRPr lang="en-US" sz="1400" dirty="0">
+              <a:solidFill>
+                <a:sysClr val="windowText" lastClr="000000"/>
+              </a:solidFill>
+            </a:endParaRPr>
+          </a:p>
+        </p:txBody>
+      </p:sp>
+      <p:sp>
+        <p:nvSpPr>
+          <p:cNvPr id="58" name="Rectangle 57">
+            <a:extLst>
+              <a:ext uri="{FF2B5EF4-FFF2-40B4-BE49-F238E27FC236}">
+                <a16:creationId xmlns:a16="http://schemas.microsoft.com/office/drawing/2014/main" id="{25FF3677-5F9B-494F-990C-78D48CE4AC1A}"/>
+              </a:ext>
+            </a:extLst>
+          </p:cNvPr>
+          <p:cNvSpPr/>
+          <p:nvPr/>
+        </p:nvSpPr>
+        <p:spPr>
+          <a:xfrm>
+            <a:off x="6362798" y="2857837"/>
+            <a:ext cx="2188030" cy="274320"/>
+          </a:xfrm>
+          <a:prstGeom prst="rect">
+            <a:avLst/>
+          </a:prstGeom>
+          <a:solidFill>
+            <a:schemeClr val="accent1">
+              <a:lumMod val="20000"/>
+              <a:lumOff val="80000"/>
+            </a:schemeClr>
+          </a:solidFill>
+          <a:ln>
+            <a:noFill/>
+          </a:ln>
+        </p:spPr>
+        <p:style>
+          <a:lnRef idx="2">
+            <a:schemeClr val="dk1"/>
+          </a:lnRef>
+          <a:fillRef idx="1">
+            <a:schemeClr val="lt1"/>
+          </a:fillRef>
+          <a:effectRef idx="0">
+            <a:schemeClr val="dk1"/>
+          </a:effectRef>
+          <a:fontRef idx="minor">
+            <a:schemeClr val="dk1"/>
+          </a:fontRef>
+        </p:style>
+        <p:txBody>
+          <a:bodyPr rtlCol="0" anchor="ctr"/>
+          <a:lstStyle/>
+          <a:p>
+            <a:r>
+              <a:rPr lang="en-US" sz="1400" dirty="0" err="1"/>
+              <a:t>bootstrapping.R</a:t>
+            </a:r>
+            <a:endParaRPr lang="en-US" sz="1400" dirty="0"/>
+          </a:p>
+        </p:txBody>
+      </p:sp>
+      <p:sp>
+        <p:nvSpPr>
+          <p:cNvPr id="59" name="Rectangle 58">
+            <a:extLst>
+              <a:ext uri="{FF2B5EF4-FFF2-40B4-BE49-F238E27FC236}">
+                <a16:creationId xmlns:a16="http://schemas.microsoft.com/office/drawing/2014/main" id="{A59D8936-D27E-4FFF-BF4A-54F81365A4FE}"/>
+              </a:ext>
+            </a:extLst>
+          </p:cNvPr>
+          <p:cNvSpPr/>
+          <p:nvPr/>
+        </p:nvSpPr>
+        <p:spPr>
+          <a:xfrm>
+            <a:off x="11605034" y="2507885"/>
+            <a:ext cx="1753092" cy="274320"/>
+          </a:xfrm>
+          <a:prstGeom prst="rect">
+            <a:avLst/>
+          </a:prstGeom>
+          <a:solidFill>
+            <a:schemeClr val="accent1">
+              <a:lumMod val="20000"/>
+              <a:lumOff val="80000"/>
+            </a:schemeClr>
+          </a:solidFill>
+          <a:ln>
+            <a:noFill/>
+          </a:ln>
+        </p:spPr>
+        <p:style>
+          <a:lnRef idx="2">
+            <a:schemeClr val="dk1"/>
+          </a:lnRef>
+          <a:fillRef idx="1">
+            <a:schemeClr val="lt1"/>
+          </a:fillRef>
+          <a:effectRef idx="0">
+            <a:schemeClr val="dk1"/>
+          </a:effectRef>
+          <a:fontRef idx="minor">
+            <a:schemeClr val="dk1"/>
+          </a:fontRef>
+        </p:style>
+        <p:txBody>
+          <a:bodyPr rtlCol="0" anchor="ctr"/>
+          <a:lstStyle/>
+          <a:p>
+            <a:r>
+              <a:rPr lang="en-US" sz="1400" dirty="0" err="1"/>
+              <a:t>distributions.R</a:t>
+            </a:r>
+            <a:endParaRPr lang="en-US" sz="1400" dirty="0"/>
+          </a:p>
+        </p:txBody>
+      </p:sp>
+      <p:sp>
+        <p:nvSpPr>
+          <p:cNvPr id="61" name="Rectangle 60">
+            <a:extLst>
+              <a:ext uri="{FF2B5EF4-FFF2-40B4-BE49-F238E27FC236}">
+                <a16:creationId xmlns:a16="http://schemas.microsoft.com/office/drawing/2014/main" id="{E0E3D146-B389-481E-B8EE-720806A33CA8}"/>
+              </a:ext>
+            </a:extLst>
+          </p:cNvPr>
+          <p:cNvSpPr/>
+          <p:nvPr/>
+        </p:nvSpPr>
+        <p:spPr>
+          <a:xfrm>
+            <a:off x="6362798" y="1701386"/>
+            <a:ext cx="2184359" cy="274320"/>
+          </a:xfrm>
+          <a:prstGeom prst="rect">
+            <a:avLst/>
+          </a:prstGeom>
+          <a:solidFill>
+            <a:schemeClr val="accent1">
+              <a:lumMod val="20000"/>
+              <a:lumOff val="80000"/>
+            </a:schemeClr>
+          </a:solidFill>
+          <a:ln>
+            <a:noFill/>
+          </a:ln>
+        </p:spPr>
+        <p:style>
+          <a:lnRef idx="2">
+            <a:schemeClr val="dk1"/>
+          </a:lnRef>
+          <a:fillRef idx="1">
+            <a:schemeClr val="lt1"/>
+          </a:fillRef>
+          <a:effectRef idx="0">
+            <a:schemeClr val="dk1"/>
+          </a:effectRef>
+          <a:fontRef idx="minor">
+            <a:schemeClr val="dk1"/>
+          </a:fontRef>
+        </p:style>
+        <p:txBody>
+          <a:bodyPr rtlCol="0" anchor="ctr"/>
+          <a:lstStyle/>
+          <a:p>
+            <a:r>
+              <a:rPr lang="en-US" sz="1400" dirty="0" err="1"/>
+              <a:t>model_functions.R</a:t>
+            </a:r>
+            <a:endParaRPr lang="en-US" sz="1400" dirty="0"/>
+          </a:p>
+        </p:txBody>
+      </p:sp>
+      <p:sp>
+        <p:nvSpPr>
+          <p:cNvPr id="62" name="Rectangle 61">
+            <a:extLst>
+              <a:ext uri="{FF2B5EF4-FFF2-40B4-BE49-F238E27FC236}">
+                <a16:creationId xmlns:a16="http://schemas.microsoft.com/office/drawing/2014/main" id="{91F730E8-2438-41EA-A267-FA28122FB057}"/>
+              </a:ext>
+            </a:extLst>
+          </p:cNvPr>
+          <p:cNvSpPr/>
+          <p:nvPr/>
+        </p:nvSpPr>
+        <p:spPr>
+          <a:xfrm>
+            <a:off x="11597540" y="2862768"/>
+            <a:ext cx="1753092" cy="274320"/>
+          </a:xfrm>
+          <a:prstGeom prst="rect">
+            <a:avLst/>
+          </a:prstGeom>
+          <a:solidFill>
+            <a:schemeClr val="accent1">
+              <a:lumMod val="20000"/>
+              <a:lumOff val="80000"/>
+            </a:schemeClr>
+          </a:solidFill>
+          <a:ln>
+            <a:noFill/>
+          </a:ln>
+        </p:spPr>
+        <p:style>
+          <a:lnRef idx="2">
+            <a:schemeClr val="dk1"/>
+          </a:lnRef>
+          <a:fillRef idx="1">
+            <a:schemeClr val="lt1"/>
+          </a:fillRef>
+          <a:effectRef idx="0">
+            <a:schemeClr val="dk1"/>
+          </a:effectRef>
+          <a:fontRef idx="minor">
+            <a:schemeClr val="dk1"/>
+          </a:fontRef>
+        </p:style>
+        <p:txBody>
+          <a:bodyPr rtlCol="0" anchor="ctr"/>
+          <a:lstStyle/>
+          <a:p>
+            <a:r>
+              <a:rPr lang="en-US" sz="1400" dirty="0" err="1"/>
+              <a:t>model_functions.R</a:t>
+            </a:r>
+            <a:endParaRPr lang="en-US" sz="1400" dirty="0"/>
+          </a:p>
+        </p:txBody>
+      </p:sp>
+      <p:sp>
+        <p:nvSpPr>
+          <p:cNvPr id="63" name="Rectangle 62">
+            <a:extLst>
+              <a:ext uri="{FF2B5EF4-FFF2-40B4-BE49-F238E27FC236}">
+                <a16:creationId xmlns:a16="http://schemas.microsoft.com/office/drawing/2014/main" id="{ABB4CBA6-92BB-4905-B0E6-4BD35BA57695}"/>
+              </a:ext>
+            </a:extLst>
+          </p:cNvPr>
+          <p:cNvSpPr/>
+          <p:nvPr/>
+        </p:nvSpPr>
+        <p:spPr>
+          <a:xfrm>
+            <a:off x="6362798" y="3431968"/>
+            <a:ext cx="2219268" cy="690805"/>
+          </a:xfrm>
+          <a:prstGeom prst="rect">
+            <a:avLst/>
+          </a:prstGeom>
+          <a:solidFill>
+            <a:schemeClr val="accent1">
+              <a:lumMod val="20000"/>
+              <a:lumOff val="80000"/>
+            </a:schemeClr>
+          </a:solidFill>
+          <a:ln>
+            <a:noFill/>
+          </a:ln>
+        </p:spPr>
+        <p:style>
+          <a:lnRef idx="2">
+            <a:schemeClr val="dk1"/>
+          </a:lnRef>
+          <a:fillRef idx="1">
+            <a:schemeClr val="lt1"/>
+          </a:fillRef>
+          <a:effectRef idx="0">
+            <a:schemeClr val="dk1"/>
+          </a:effectRef>
+          <a:fontRef idx="minor">
+            <a:schemeClr val="dk1"/>
+          </a:fontRef>
+        </p:style>
+        <p:txBody>
+          <a:bodyPr rtlCol="0" anchor="ctr"/>
+          <a:lstStyle/>
+          <a:p>
+            <a:r>
+              <a:rPr lang="en-US" sz="1400" dirty="0" err="1"/>
+              <a:t>data_preparation</a:t>
+            </a:r>
+            <a:r>
+              <a:rPr lang="en-US" sz="1400" dirty="0"/>
+              <a:t>/</a:t>
+            </a:r>
+            <a:r>
+              <a:rPr lang="en-US" sz="1400" dirty="0" err="1"/>
+              <a:t>do_tidy_match.R</a:t>
+            </a:r>
+            <a:r>
+              <a:rPr lang="en-US" sz="1400" dirty="0"/>
+              <a:t> (called in </a:t>
+            </a:r>
+            <a:r>
+              <a:rPr lang="en-US" sz="1400" dirty="0" err="1"/>
+              <a:t>main.R</a:t>
+            </a:r>
+            <a:r>
+              <a:rPr lang="en-US" sz="1400" dirty="0"/>
+              <a:t>)</a:t>
+            </a:r>
+          </a:p>
+        </p:txBody>
+      </p:sp>
+      <p:sp>
+        <p:nvSpPr>
+          <p:cNvPr id="64" name="Rectangle 63">
+            <a:extLst>
+              <a:ext uri="{FF2B5EF4-FFF2-40B4-BE49-F238E27FC236}">
+                <a16:creationId xmlns:a16="http://schemas.microsoft.com/office/drawing/2014/main" id="{41EC9AC2-7CDB-4B9E-9C90-451472B91601}"/>
+              </a:ext>
+            </a:extLst>
+          </p:cNvPr>
+          <p:cNvSpPr/>
+          <p:nvPr/>
+        </p:nvSpPr>
+        <p:spPr>
+          <a:xfrm>
+            <a:off x="-893985" y="789833"/>
+            <a:ext cx="627797" cy="239417"/>
+          </a:xfrm>
+          <a:prstGeom prst="rect">
+            <a:avLst/>
+          </a:prstGeom>
+          <a:noFill/>
+          <a:ln>
+            <a:noFill/>
+          </a:ln>
+        </p:spPr>
+        <p:style>
+          <a:lnRef idx="0">
+            <a:scrgbClr r="0" g="0" b="0"/>
+          </a:lnRef>
+          <a:fillRef idx="0">
+            <a:scrgbClr r="0" g="0" b="0"/>
+          </a:fillRef>
+          <a:effectRef idx="0">
+            <a:scrgbClr r="0" g="0" b="0"/>
+          </a:effectRef>
+          <a:fontRef idx="minor">
+            <a:schemeClr val="dk1"/>
+          </a:fontRef>
+        </p:style>
+        <p:txBody>
+          <a:bodyPr rtlCol="0" anchor="ctr"/>
+          <a:lstStyle/>
+          <a:p>
+            <a:pPr algn="ctr"/>
+            <a:r>
+              <a:rPr lang="en-US" sz="1400" i="1" dirty="0"/>
+              <a:t>calls</a:t>
+            </a:r>
+          </a:p>
+        </p:txBody>
+      </p:sp>
+      <p:cxnSp>
+        <p:nvCxnSpPr>
+          <p:cNvPr id="65" name="Straight Arrow Connector 64">
+            <a:extLst>
+              <a:ext uri="{FF2B5EF4-FFF2-40B4-BE49-F238E27FC236}">
+                <a16:creationId xmlns:a16="http://schemas.microsoft.com/office/drawing/2014/main" id="{8C000004-B8DA-4571-BA81-1AF4851B6551}"/>
+              </a:ext>
+            </a:extLst>
+          </p:cNvPr>
+          <p:cNvCxnSpPr>
+            <a:cxnSpLocks/>
+          </p:cNvCxnSpPr>
+          <p:nvPr/>
+        </p:nvCxnSpPr>
+        <p:spPr>
+          <a:xfrm>
+            <a:off x="2906540" y="1842273"/>
+            <a:ext cx="286187" cy="0"/>
+          </a:xfrm>
+          <a:prstGeom prst="straightConnector1">
+            <a:avLst/>
+          </a:prstGeom>
+          <a:ln>
+            <a:tailEnd type="triangle"/>
+          </a:ln>
+        </p:spPr>
+        <p:style>
+          <a:lnRef idx="1">
+            <a:schemeClr val="dk1"/>
+          </a:lnRef>
+          <a:fillRef idx="0">
+            <a:schemeClr val="dk1"/>
+          </a:fillRef>
+          <a:effectRef idx="0">
+            <a:schemeClr val="dk1"/>
+          </a:effectRef>
+          <a:fontRef idx="minor">
+            <a:schemeClr val="tx1"/>
+          </a:fontRef>
+        </p:style>
+      </p:cxnSp>
+      <p:cxnSp>
+        <p:nvCxnSpPr>
+          <p:cNvPr id="66" name="Straight Arrow Connector 65">
+            <a:extLst>
+              <a:ext uri="{FF2B5EF4-FFF2-40B4-BE49-F238E27FC236}">
+                <a16:creationId xmlns:a16="http://schemas.microsoft.com/office/drawing/2014/main" id="{F08B5960-547A-472E-BCDF-35042F0A48AA}"/>
+              </a:ext>
+            </a:extLst>
+          </p:cNvPr>
+          <p:cNvCxnSpPr>
+            <a:cxnSpLocks/>
+          </p:cNvCxnSpPr>
+          <p:nvPr/>
+        </p:nvCxnSpPr>
+        <p:spPr>
+          <a:xfrm>
+            <a:off x="2906540" y="2174553"/>
+            <a:ext cx="286187" cy="0"/>
+          </a:xfrm>
+          <a:prstGeom prst="straightConnector1">
+            <a:avLst/>
+          </a:prstGeom>
+          <a:ln>
+            <a:tailEnd type="triangle"/>
+          </a:ln>
+        </p:spPr>
+        <p:style>
+          <a:lnRef idx="1">
+            <a:schemeClr val="dk1"/>
+          </a:lnRef>
+          <a:fillRef idx="0">
+            <a:schemeClr val="dk1"/>
+          </a:fillRef>
+          <a:effectRef idx="0">
+            <a:schemeClr val="dk1"/>
+          </a:effectRef>
+          <a:fontRef idx="minor">
+            <a:schemeClr val="tx1"/>
+          </a:fontRef>
+        </p:style>
+      </p:cxnSp>
+      <p:cxnSp>
+        <p:nvCxnSpPr>
+          <p:cNvPr id="67" name="Straight Arrow Connector 66">
+            <a:extLst>
+              <a:ext uri="{FF2B5EF4-FFF2-40B4-BE49-F238E27FC236}">
+                <a16:creationId xmlns:a16="http://schemas.microsoft.com/office/drawing/2014/main" id="{2F55A013-EDB8-4798-901B-11DCC0E45AFD}"/>
+              </a:ext>
+            </a:extLst>
+          </p:cNvPr>
+          <p:cNvCxnSpPr>
+            <a:cxnSpLocks/>
+          </p:cNvCxnSpPr>
+          <p:nvPr/>
+        </p:nvCxnSpPr>
+        <p:spPr>
+          <a:xfrm>
+            <a:off x="2906540" y="2881583"/>
+            <a:ext cx="286187" cy="0"/>
+          </a:xfrm>
+          <a:prstGeom prst="straightConnector1">
+            <a:avLst/>
+          </a:prstGeom>
+          <a:ln>
+            <a:tailEnd type="triangle"/>
+          </a:ln>
+        </p:spPr>
+        <p:style>
+          <a:lnRef idx="1">
+            <a:schemeClr val="dk1"/>
+          </a:lnRef>
+          <a:fillRef idx="0">
+            <a:schemeClr val="dk1"/>
+          </a:fillRef>
+          <a:effectRef idx="0">
+            <a:schemeClr val="dk1"/>
+          </a:effectRef>
+          <a:fontRef idx="minor">
+            <a:schemeClr val="tx1"/>
+          </a:fontRef>
+        </p:style>
+      </p:cxnSp>
+      <p:cxnSp>
+        <p:nvCxnSpPr>
+          <p:cNvPr id="68" name="Straight Arrow Connector 67">
+            <a:extLst>
+              <a:ext uri="{FF2B5EF4-FFF2-40B4-BE49-F238E27FC236}">
+                <a16:creationId xmlns:a16="http://schemas.microsoft.com/office/drawing/2014/main" id="{40EDB40C-5650-4530-A4F7-98B9B2A40F42}"/>
+              </a:ext>
+            </a:extLst>
+          </p:cNvPr>
+          <p:cNvCxnSpPr>
+            <a:cxnSpLocks/>
+          </p:cNvCxnSpPr>
+          <p:nvPr/>
+        </p:nvCxnSpPr>
+        <p:spPr>
+          <a:xfrm>
+            <a:off x="2906540" y="3768496"/>
+            <a:ext cx="286187" cy="0"/>
+          </a:xfrm>
+          <a:prstGeom prst="straightConnector1">
+            <a:avLst/>
+          </a:prstGeom>
+          <a:ln>
+            <a:tailEnd type="triangle"/>
+          </a:ln>
+        </p:spPr>
+        <p:style>
+          <a:lnRef idx="1">
+            <a:schemeClr val="dk1"/>
+          </a:lnRef>
+          <a:fillRef idx="0">
+            <a:schemeClr val="dk1"/>
+          </a:fillRef>
+          <a:effectRef idx="0">
+            <a:schemeClr val="dk1"/>
+          </a:effectRef>
+          <a:fontRef idx="minor">
+            <a:schemeClr val="tx1"/>
+          </a:fontRef>
+        </p:style>
+      </p:cxnSp>
+      <p:sp>
+        <p:nvSpPr>
+          <p:cNvPr id="69" name="Rectangle 68">
+            <a:extLst>
+              <a:ext uri="{FF2B5EF4-FFF2-40B4-BE49-F238E27FC236}">
+                <a16:creationId xmlns:a16="http://schemas.microsoft.com/office/drawing/2014/main" id="{4522708B-2E97-4D10-A0A2-AE239147F24B}"/>
+              </a:ext>
+            </a:extLst>
+          </p:cNvPr>
+          <p:cNvSpPr/>
+          <p:nvPr/>
+        </p:nvSpPr>
+        <p:spPr>
+          <a:xfrm>
+            <a:off x="-1843051" y="939030"/>
+            <a:ext cx="570725" cy="239417"/>
+          </a:xfrm>
+          <a:prstGeom prst="rect">
+            <a:avLst/>
+          </a:prstGeom>
+          <a:noFill/>
+          <a:ln>
+            <a:noFill/>
+          </a:ln>
+        </p:spPr>
+        <p:style>
+          <a:lnRef idx="0">
+            <a:scrgbClr r="0" g="0" b="0"/>
+          </a:lnRef>
+          <a:fillRef idx="0">
+            <a:scrgbClr r="0" g="0" b="0"/>
+          </a:fillRef>
+          <a:effectRef idx="0">
+            <a:scrgbClr r="0" g="0" b="0"/>
+          </a:effectRef>
+          <a:fontRef idx="minor">
+            <a:schemeClr val="dk1"/>
+          </a:fontRef>
+        </p:style>
+        <p:txBody>
+          <a:bodyPr rtlCol="0" anchor="ctr"/>
+          <a:lstStyle/>
+          <a:p>
+            <a:pPr algn="ctr"/>
+            <a:r>
+              <a:rPr lang="en-US" sz="1400" i="1" dirty="0"/>
+              <a:t>calls</a:t>
+            </a:r>
+          </a:p>
+        </p:txBody>
+      </p:sp>
+      <p:sp>
+        <p:nvSpPr>
+          <p:cNvPr id="70" name="Rectangle 69">
+            <a:extLst>
+              <a:ext uri="{FF2B5EF4-FFF2-40B4-BE49-F238E27FC236}">
+                <a16:creationId xmlns:a16="http://schemas.microsoft.com/office/drawing/2014/main" id="{4501ED2C-59E3-4467-ACCF-6539B88FCC31}"/>
+              </a:ext>
+            </a:extLst>
+          </p:cNvPr>
+          <p:cNvSpPr/>
+          <p:nvPr/>
+        </p:nvSpPr>
+        <p:spPr>
+          <a:xfrm>
+            <a:off x="4939160" y="804790"/>
+            <a:ext cx="1751850" cy="289695"/>
+          </a:xfrm>
+          <a:prstGeom prst="rect">
+            <a:avLst/>
+          </a:prstGeom>
+          <a:noFill/>
+          <a:ln>
+            <a:noFill/>
+          </a:ln>
+        </p:spPr>
+        <p:style>
+          <a:lnRef idx="0">
+            <a:scrgbClr r="0" g="0" b="0"/>
+          </a:lnRef>
+          <a:fillRef idx="0">
+            <a:scrgbClr r="0" g="0" b="0"/>
+          </a:fillRef>
+          <a:effectRef idx="0">
+            <a:scrgbClr r="0" g="0" b="0"/>
+          </a:effectRef>
+          <a:fontRef idx="minor">
+            <a:schemeClr val="dk1"/>
+          </a:fontRef>
+        </p:style>
+        <p:txBody>
+          <a:bodyPr rtlCol="0" anchor="ctr"/>
+          <a:lstStyle/>
+          <a:p>
+            <a:pPr algn="ctr"/>
+            <a:r>
+              <a:rPr lang="en-US" sz="1400" i="1" dirty="0"/>
+              <a:t>data produced by</a:t>
+            </a:r>
+          </a:p>
+        </p:txBody>
+      </p:sp>
+      <p:cxnSp>
+        <p:nvCxnSpPr>
+          <p:cNvPr id="71" name="Straight Arrow Connector 70">
+            <a:extLst>
+              <a:ext uri="{FF2B5EF4-FFF2-40B4-BE49-F238E27FC236}">
+                <a16:creationId xmlns:a16="http://schemas.microsoft.com/office/drawing/2014/main" id="{9862A6AE-E299-4579-A311-B70C88106791}"/>
+              </a:ext>
+            </a:extLst>
+          </p:cNvPr>
+          <p:cNvCxnSpPr>
+            <a:cxnSpLocks/>
+          </p:cNvCxnSpPr>
+          <p:nvPr/>
+        </p:nvCxnSpPr>
+        <p:spPr>
+          <a:xfrm>
+            <a:off x="6030318" y="1823422"/>
+            <a:ext cx="286187" cy="0"/>
+          </a:xfrm>
+          <a:prstGeom prst="straightConnector1">
+            <a:avLst/>
+          </a:prstGeom>
+          <a:ln>
+            <a:tailEnd type="triangle"/>
+          </a:ln>
+        </p:spPr>
+        <p:style>
+          <a:lnRef idx="1">
+            <a:schemeClr val="dk1"/>
+          </a:lnRef>
+          <a:fillRef idx="0">
+            <a:schemeClr val="dk1"/>
+          </a:fillRef>
+          <a:effectRef idx="0">
+            <a:schemeClr val="dk1"/>
+          </a:effectRef>
+          <a:fontRef idx="minor">
+            <a:schemeClr val="tx1"/>
+          </a:fontRef>
+        </p:style>
+      </p:cxnSp>
+      <p:cxnSp>
+        <p:nvCxnSpPr>
+          <p:cNvPr id="72" name="Straight Arrow Connector 71">
+            <a:extLst>
+              <a:ext uri="{FF2B5EF4-FFF2-40B4-BE49-F238E27FC236}">
+                <a16:creationId xmlns:a16="http://schemas.microsoft.com/office/drawing/2014/main" id="{BDEE8E68-0AF1-4867-8EE7-FF5693CC8638}"/>
+              </a:ext>
+            </a:extLst>
+          </p:cNvPr>
+          <p:cNvCxnSpPr>
+            <a:cxnSpLocks/>
+          </p:cNvCxnSpPr>
+          <p:nvPr/>
+        </p:nvCxnSpPr>
+        <p:spPr>
+          <a:xfrm>
+            <a:off x="6030318" y="3009597"/>
+            <a:ext cx="286187" cy="0"/>
+          </a:xfrm>
+          <a:prstGeom prst="straightConnector1">
+            <a:avLst/>
+          </a:prstGeom>
+          <a:ln>
+            <a:tailEnd type="triangle"/>
+          </a:ln>
+        </p:spPr>
+        <p:style>
+          <a:lnRef idx="1">
+            <a:schemeClr val="dk1"/>
+          </a:lnRef>
+          <a:fillRef idx="0">
+            <a:schemeClr val="dk1"/>
+          </a:fillRef>
+          <a:effectRef idx="0">
+            <a:schemeClr val="dk1"/>
+          </a:effectRef>
+          <a:fontRef idx="minor">
+            <a:schemeClr val="tx1"/>
+          </a:fontRef>
+        </p:style>
+      </p:cxnSp>
+      <p:cxnSp>
+        <p:nvCxnSpPr>
+          <p:cNvPr id="78" name="Straight Arrow Connector 77">
+            <a:extLst>
+              <a:ext uri="{FF2B5EF4-FFF2-40B4-BE49-F238E27FC236}">
+                <a16:creationId xmlns:a16="http://schemas.microsoft.com/office/drawing/2014/main" id="{10044867-1229-49FF-860E-C280100B6E78}"/>
+              </a:ext>
+            </a:extLst>
+          </p:cNvPr>
+          <p:cNvCxnSpPr>
+            <a:cxnSpLocks/>
+          </p:cNvCxnSpPr>
+          <p:nvPr/>
+        </p:nvCxnSpPr>
+        <p:spPr>
+          <a:xfrm>
+            <a:off x="6030318" y="3764635"/>
+            <a:ext cx="286187" cy="0"/>
+          </a:xfrm>
+          <a:prstGeom prst="straightConnector1">
+            <a:avLst/>
+          </a:prstGeom>
+          <a:ln>
+            <a:tailEnd type="triangle"/>
+          </a:ln>
+        </p:spPr>
+        <p:style>
+          <a:lnRef idx="1">
+            <a:schemeClr val="dk1"/>
+          </a:lnRef>
+          <a:fillRef idx="0">
+            <a:schemeClr val="dk1"/>
+          </a:fillRef>
+          <a:effectRef idx="0">
+            <a:schemeClr val="dk1"/>
+          </a:effectRef>
+          <a:fontRef idx="minor">
+            <a:schemeClr val="tx1"/>
+          </a:fontRef>
+        </p:style>
+      </p:cxnSp>
+      <p:cxnSp>
+        <p:nvCxnSpPr>
+          <p:cNvPr id="79" name="Straight Arrow Connector 78">
+            <a:extLst>
+              <a:ext uri="{FF2B5EF4-FFF2-40B4-BE49-F238E27FC236}">
+                <a16:creationId xmlns:a16="http://schemas.microsoft.com/office/drawing/2014/main" id="{88530F32-0C1E-4EF2-B694-668297B09F0B}"/>
+              </a:ext>
+            </a:extLst>
+          </p:cNvPr>
+          <p:cNvCxnSpPr>
+            <a:cxnSpLocks/>
+          </p:cNvCxnSpPr>
+          <p:nvPr/>
+        </p:nvCxnSpPr>
+        <p:spPr>
+          <a:xfrm>
+            <a:off x="6030318" y="2639501"/>
+            <a:ext cx="2954656" cy="0"/>
+          </a:xfrm>
+          <a:prstGeom prst="straightConnector1">
+            <a:avLst/>
+          </a:prstGeom>
+          <a:ln>
+            <a:tailEnd type="triangle"/>
+          </a:ln>
+        </p:spPr>
+        <p:style>
+          <a:lnRef idx="1">
+            <a:schemeClr val="dk1"/>
+          </a:lnRef>
+          <a:fillRef idx="0">
+            <a:schemeClr val="dk1"/>
+          </a:fillRef>
+          <a:effectRef idx="0">
+            <a:schemeClr val="dk1"/>
+          </a:effectRef>
+          <a:fontRef idx="minor">
+            <a:schemeClr val="tx1"/>
+          </a:fontRef>
+        </p:style>
+      </p:cxnSp>
+      <p:sp>
+        <p:nvSpPr>
+          <p:cNvPr id="80" name="Rectangle 79">
+            <a:extLst>
+              <a:ext uri="{FF2B5EF4-FFF2-40B4-BE49-F238E27FC236}">
+                <a16:creationId xmlns:a16="http://schemas.microsoft.com/office/drawing/2014/main" id="{F7923E8C-2717-4BB8-9F89-E7C97E63B5EA}"/>
+              </a:ext>
+            </a:extLst>
+          </p:cNvPr>
+          <p:cNvSpPr/>
+          <p:nvPr/>
+        </p:nvSpPr>
+        <p:spPr>
+          <a:xfrm>
+            <a:off x="7745870" y="867310"/>
+            <a:ext cx="570725" cy="239417"/>
+          </a:xfrm>
+          <a:prstGeom prst="rect">
+            <a:avLst/>
+          </a:prstGeom>
+          <a:noFill/>
+          <a:ln>
+            <a:noFill/>
+          </a:ln>
+        </p:spPr>
+        <p:style>
+          <a:lnRef idx="0">
+            <a:scrgbClr r="0" g="0" b="0"/>
+          </a:lnRef>
+          <a:fillRef idx="0">
+            <a:scrgbClr r="0" g="0" b="0"/>
+          </a:fillRef>
+          <a:effectRef idx="0">
+            <a:scrgbClr r="0" g="0" b="0"/>
+          </a:effectRef>
+          <a:fontRef idx="minor">
+            <a:schemeClr val="dk1"/>
+          </a:fontRef>
+        </p:style>
+        <p:txBody>
+          <a:bodyPr rtlCol="0" anchor="ctr"/>
+          <a:lstStyle/>
+          <a:p>
+            <a:pPr algn="ctr"/>
+            <a:r>
+              <a:rPr lang="en-US" sz="1400" i="1" dirty="0"/>
+              <a:t>calls</a:t>
+            </a:r>
+          </a:p>
+        </p:txBody>
+      </p:sp>
+      <p:cxnSp>
+        <p:nvCxnSpPr>
+          <p:cNvPr id="81" name="Straight Arrow Connector 80">
+            <a:extLst>
+              <a:ext uri="{FF2B5EF4-FFF2-40B4-BE49-F238E27FC236}">
+                <a16:creationId xmlns:a16="http://schemas.microsoft.com/office/drawing/2014/main" id="{61FC7C58-1FC6-4A39-8E3F-19698FF8909F}"/>
+              </a:ext>
+            </a:extLst>
+          </p:cNvPr>
+          <p:cNvCxnSpPr>
+            <a:cxnSpLocks/>
+          </p:cNvCxnSpPr>
+          <p:nvPr/>
+        </p:nvCxnSpPr>
+        <p:spPr>
+          <a:xfrm>
+            <a:off x="11273683" y="2679048"/>
+            <a:ext cx="286187" cy="0"/>
+          </a:xfrm>
+          <a:prstGeom prst="straightConnector1">
+            <a:avLst/>
+          </a:prstGeom>
+          <a:ln>
+            <a:tailEnd type="triangle"/>
+          </a:ln>
+        </p:spPr>
+        <p:style>
+          <a:lnRef idx="1">
+            <a:schemeClr val="dk1"/>
+          </a:lnRef>
+          <a:fillRef idx="0">
+            <a:schemeClr val="dk1"/>
+          </a:fillRef>
+          <a:effectRef idx="0">
+            <a:schemeClr val="dk1"/>
+          </a:effectRef>
+          <a:fontRef idx="minor">
+            <a:schemeClr val="tx1"/>
+          </a:fontRef>
+        </p:style>
+      </p:cxnSp>
+      <p:cxnSp>
+        <p:nvCxnSpPr>
+          <p:cNvPr id="82" name="Straight Arrow Connector 81">
+            <a:extLst>
+              <a:ext uri="{FF2B5EF4-FFF2-40B4-BE49-F238E27FC236}">
+                <a16:creationId xmlns:a16="http://schemas.microsoft.com/office/drawing/2014/main" id="{221815C4-03C8-4E3E-A8B7-E7E4AF039891}"/>
+              </a:ext>
+            </a:extLst>
+          </p:cNvPr>
+          <p:cNvCxnSpPr>
+            <a:cxnSpLocks/>
+          </p:cNvCxnSpPr>
+          <p:nvPr/>
+        </p:nvCxnSpPr>
+        <p:spPr>
+          <a:xfrm>
+            <a:off x="11273683" y="2979033"/>
+            <a:ext cx="286187" cy="0"/>
+          </a:xfrm>
+          <a:prstGeom prst="straightConnector1">
+            <a:avLst/>
+          </a:prstGeom>
+          <a:ln>
+            <a:tailEnd type="triangle"/>
+          </a:ln>
+        </p:spPr>
+        <p:style>
+          <a:lnRef idx="1">
+            <a:schemeClr val="dk1"/>
+          </a:lnRef>
+          <a:fillRef idx="0">
+            <a:schemeClr val="dk1"/>
+          </a:fillRef>
+          <a:effectRef idx="0">
+            <a:schemeClr val="dk1"/>
+          </a:effectRef>
+          <a:fontRef idx="minor">
+            <a:schemeClr val="tx1"/>
+          </a:fontRef>
+        </p:style>
+      </p:cxnSp>
+      <p:sp>
+        <p:nvSpPr>
+          <p:cNvPr id="83" name="Rectangle 82">
+            <a:extLst>
+              <a:ext uri="{FF2B5EF4-FFF2-40B4-BE49-F238E27FC236}">
+                <a16:creationId xmlns:a16="http://schemas.microsoft.com/office/drawing/2014/main" id="{27B0BA35-1BA5-4308-8BA5-3AB27F22265A}"/>
+              </a:ext>
+            </a:extLst>
+          </p:cNvPr>
+          <p:cNvSpPr/>
+          <p:nvPr/>
+        </p:nvSpPr>
+        <p:spPr>
+          <a:xfrm>
+            <a:off x="-1958032" y="291316"/>
+            <a:ext cx="1124146" cy="406137"/>
+          </a:xfrm>
+          <a:prstGeom prst="rect">
+            <a:avLst/>
+          </a:prstGeom>
+          <a:noFill/>
+          <a:ln>
+            <a:noFill/>
+          </a:ln>
+        </p:spPr>
+        <p:style>
+          <a:lnRef idx="0">
+            <a:scrgbClr r="0" g="0" b="0"/>
+          </a:lnRef>
+          <a:fillRef idx="0">
+            <a:scrgbClr r="0" g="0" b="0"/>
+          </a:fillRef>
+          <a:effectRef idx="0">
+            <a:scrgbClr r="0" g="0" b="0"/>
+          </a:effectRef>
+          <a:fontRef idx="minor">
+            <a:schemeClr val="dk1"/>
+          </a:fontRef>
+        </p:style>
+        <p:txBody>
+          <a:bodyPr lIns="0" rIns="0" rtlCol="0" anchor="ctr"/>
+          <a:lstStyle/>
+          <a:p>
+            <a:pPr algn="ctr"/>
+            <a:r>
+              <a:rPr lang="en-US" sz="1400" i="1" dirty="0"/>
+              <a:t>Results saved as .csv in</a:t>
+            </a:r>
+          </a:p>
+        </p:txBody>
+      </p:sp>
+      <p:cxnSp>
+        <p:nvCxnSpPr>
+          <p:cNvPr id="84" name="Straight Arrow Connector 83">
+            <a:extLst>
+              <a:ext uri="{FF2B5EF4-FFF2-40B4-BE49-F238E27FC236}">
+                <a16:creationId xmlns:a16="http://schemas.microsoft.com/office/drawing/2014/main" id="{5AD35C92-8EEE-4AD2-A944-ABB3E6FD2697}"/>
+              </a:ext>
+            </a:extLst>
+          </p:cNvPr>
+          <p:cNvCxnSpPr>
+            <a:cxnSpLocks/>
+          </p:cNvCxnSpPr>
+          <p:nvPr/>
+        </p:nvCxnSpPr>
+        <p:spPr>
+          <a:xfrm flipH="1">
+            <a:off x="683449" y="2782205"/>
+            <a:ext cx="286187" cy="0"/>
+          </a:xfrm>
+          <a:prstGeom prst="straightConnector1">
+            <a:avLst/>
+          </a:prstGeom>
+          <a:ln>
+            <a:tailEnd type="triangle"/>
+          </a:ln>
+        </p:spPr>
+        <p:style>
+          <a:lnRef idx="1">
+            <a:schemeClr val="dk1"/>
+          </a:lnRef>
+          <a:fillRef idx="0">
+            <a:schemeClr val="dk1"/>
+          </a:fillRef>
+          <a:effectRef idx="0">
+            <a:schemeClr val="dk1"/>
+          </a:effectRef>
+          <a:fontRef idx="minor">
+            <a:schemeClr val="tx1"/>
+          </a:fontRef>
+        </p:style>
+      </p:cxnSp>
+      <p:sp>
+        <p:nvSpPr>
+          <p:cNvPr id="87" name="Rectangle 86">
+            <a:extLst>
+              <a:ext uri="{FF2B5EF4-FFF2-40B4-BE49-F238E27FC236}">
+                <a16:creationId xmlns:a16="http://schemas.microsoft.com/office/drawing/2014/main" id="{560868AF-38F4-442C-B01A-773954B190BC}"/>
+              </a:ext>
+            </a:extLst>
+          </p:cNvPr>
+          <p:cNvSpPr/>
+          <p:nvPr/>
+        </p:nvSpPr>
+        <p:spPr>
+          <a:xfrm>
+            <a:off x="-219229" y="2647778"/>
+            <a:ext cx="874068" cy="274320"/>
+          </a:xfrm>
+          <a:prstGeom prst="rect">
+            <a:avLst/>
+          </a:prstGeom>
+          <a:solidFill>
+            <a:schemeClr val="accent4">
+              <a:lumMod val="20000"/>
+              <a:lumOff val="80000"/>
+            </a:schemeClr>
+          </a:solidFill>
+          <a:ln>
+            <a:noFill/>
+          </a:ln>
+        </p:spPr>
+        <p:style>
+          <a:lnRef idx="2">
+            <a:schemeClr val="dk1"/>
+          </a:lnRef>
+          <a:fillRef idx="1">
+            <a:schemeClr val="lt1"/>
+          </a:fillRef>
+          <a:effectRef idx="0">
+            <a:schemeClr val="dk1"/>
+          </a:effectRef>
+          <a:fontRef idx="minor">
+            <a:schemeClr val="dk1"/>
+          </a:fontRef>
+        </p:style>
+        <p:txBody>
+          <a:bodyPr rtlCol="0" anchor="ctr"/>
+          <a:lstStyle/>
+          <a:p>
+            <a:r>
+              <a:rPr lang="en-US" sz="1400" dirty="0"/>
+              <a:t>results/</a:t>
+            </a:r>
+          </a:p>
+        </p:txBody>
+      </p:sp>
+      <p:sp>
+        <p:nvSpPr>
+          <p:cNvPr id="88" name="Rectangle 87">
+            <a:extLst>
+              <a:ext uri="{FF2B5EF4-FFF2-40B4-BE49-F238E27FC236}">
+                <a16:creationId xmlns:a16="http://schemas.microsoft.com/office/drawing/2014/main" id="{200A5AD3-D02B-402C-989A-A2EF2E6EF80E}"/>
+              </a:ext>
+            </a:extLst>
+          </p:cNvPr>
+          <p:cNvSpPr/>
+          <p:nvPr/>
+        </p:nvSpPr>
+        <p:spPr>
+          <a:xfrm>
+            <a:off x="-58186" y="4523477"/>
+            <a:ext cx="842165" cy="274320"/>
+          </a:xfrm>
+          <a:prstGeom prst="rect">
+            <a:avLst/>
+          </a:prstGeom>
+          <a:solidFill>
+            <a:schemeClr val="accent1">
+              <a:lumMod val="20000"/>
+              <a:lumOff val="80000"/>
+            </a:schemeClr>
+          </a:solidFill>
+          <a:ln>
+            <a:noFill/>
+          </a:ln>
+        </p:spPr>
+        <p:style>
+          <a:lnRef idx="2">
+            <a:schemeClr val="dk1"/>
+          </a:lnRef>
+          <a:fillRef idx="1">
+            <a:schemeClr val="lt1"/>
+          </a:fillRef>
+          <a:effectRef idx="0">
+            <a:schemeClr val="dk1"/>
+          </a:effectRef>
+          <a:fontRef idx="minor">
+            <a:schemeClr val="dk1"/>
+          </a:fontRef>
+        </p:style>
+        <p:txBody>
+          <a:bodyPr rtlCol="0" anchor="ctr"/>
+          <a:lstStyle/>
+          <a:p>
+            <a:r>
+              <a:rPr lang="en-US" sz="1400" dirty="0"/>
+              <a:t>scripts</a:t>
+            </a:r>
+          </a:p>
+        </p:txBody>
+      </p:sp>
+      <p:sp>
+        <p:nvSpPr>
+          <p:cNvPr id="89" name="Rectangle 88">
+            <a:extLst>
+              <a:ext uri="{FF2B5EF4-FFF2-40B4-BE49-F238E27FC236}">
+                <a16:creationId xmlns:a16="http://schemas.microsoft.com/office/drawing/2014/main" id="{14C9569B-5064-4ECE-BDF3-53B150DCFB86}"/>
+              </a:ext>
+            </a:extLst>
+          </p:cNvPr>
+          <p:cNvSpPr/>
+          <p:nvPr/>
+        </p:nvSpPr>
+        <p:spPr>
+          <a:xfrm>
+            <a:off x="-58187" y="4887275"/>
+            <a:ext cx="842165" cy="274320"/>
+          </a:xfrm>
+          <a:prstGeom prst="rect">
+            <a:avLst/>
+          </a:prstGeom>
+          <a:solidFill>
+            <a:schemeClr val="accent5">
+              <a:lumMod val="20000"/>
+              <a:lumOff val="80000"/>
+            </a:schemeClr>
+          </a:solidFill>
+          <a:ln>
+            <a:noFill/>
+          </a:ln>
+        </p:spPr>
+        <p:style>
+          <a:lnRef idx="2">
+            <a:schemeClr val="dk1"/>
+          </a:lnRef>
+          <a:fillRef idx="1">
+            <a:schemeClr val="lt1"/>
+          </a:fillRef>
+          <a:effectRef idx="0">
+            <a:schemeClr val="dk1"/>
+          </a:effectRef>
+          <a:fontRef idx="minor">
+            <a:schemeClr val="dk1"/>
+          </a:fontRef>
+        </p:style>
+        <p:txBody>
+          <a:bodyPr rtlCol="0" anchor="ctr"/>
+          <a:lstStyle/>
+          <a:p>
+            <a:r>
+              <a:rPr lang="en-US" sz="1400" dirty="0"/>
+              <a:t>.</a:t>
+            </a:r>
+            <a:r>
+              <a:rPr lang="en-US" sz="1400" dirty="0" err="1"/>
+              <a:t>Rdata</a:t>
+            </a:r>
+            <a:endParaRPr lang="en-US" sz="1400" dirty="0"/>
+          </a:p>
+        </p:txBody>
+      </p:sp>
+      <p:sp>
+        <p:nvSpPr>
+          <p:cNvPr id="91" name="Rectangle 90">
+            <a:extLst>
+              <a:ext uri="{FF2B5EF4-FFF2-40B4-BE49-F238E27FC236}">
+                <a16:creationId xmlns:a16="http://schemas.microsoft.com/office/drawing/2014/main" id="{0FF9B89B-F9AC-454F-893E-190DE4D41C8C}"/>
+              </a:ext>
+            </a:extLst>
+          </p:cNvPr>
+          <p:cNvSpPr/>
+          <p:nvPr/>
+        </p:nvSpPr>
+        <p:spPr>
+          <a:xfrm>
+            <a:off x="-58188" y="5251073"/>
+            <a:ext cx="842165" cy="274320"/>
+          </a:xfrm>
+          <a:prstGeom prst="rect">
+            <a:avLst/>
+          </a:prstGeom>
+          <a:solidFill>
+            <a:schemeClr val="accent4">
+              <a:lumMod val="20000"/>
+              <a:lumOff val="80000"/>
+            </a:schemeClr>
+          </a:solidFill>
+          <a:ln>
+            <a:noFill/>
+          </a:ln>
+        </p:spPr>
+        <p:style>
+          <a:lnRef idx="2">
+            <a:schemeClr val="dk1"/>
+          </a:lnRef>
+          <a:fillRef idx="1">
+            <a:schemeClr val="lt1"/>
+          </a:fillRef>
+          <a:effectRef idx="0">
+            <a:schemeClr val="dk1"/>
+          </a:effectRef>
+          <a:fontRef idx="minor">
+            <a:schemeClr val="dk1"/>
+          </a:fontRef>
+        </p:style>
+        <p:txBody>
+          <a:bodyPr rtlCol="0" anchor="ctr"/>
+          <a:lstStyle/>
+          <a:p>
+            <a:r>
+              <a:rPr lang="en-US" sz="1400" dirty="0"/>
+              <a:t>.csv</a:t>
+            </a:r>
+          </a:p>
+        </p:txBody>
+      </p:sp>
+      <p:sp>
+        <p:nvSpPr>
+          <p:cNvPr id="94" name="Rectangle 93">
+            <a:extLst>
+              <a:ext uri="{FF2B5EF4-FFF2-40B4-BE49-F238E27FC236}">
+                <a16:creationId xmlns:a16="http://schemas.microsoft.com/office/drawing/2014/main" id="{70035C45-D2CF-4884-85CE-85BAF5B4A3E5}"/>
+              </a:ext>
+            </a:extLst>
+          </p:cNvPr>
+          <p:cNvSpPr/>
+          <p:nvPr/>
+        </p:nvSpPr>
+        <p:spPr>
+          <a:xfrm>
+            <a:off x="762512" y="4907821"/>
+            <a:ext cx="8811794" cy="252178"/>
+          </a:xfrm>
+          <a:prstGeom prst="rect">
+            <a:avLst/>
+          </a:prstGeom>
+          <a:noFill/>
+          <a:ln>
+            <a:noFill/>
+          </a:ln>
+        </p:spPr>
+        <p:style>
+          <a:lnRef idx="0">
+            <a:scrgbClr r="0" g="0" b="0"/>
+          </a:lnRef>
+          <a:fillRef idx="0">
+            <a:scrgbClr r="0" g="0" b="0"/>
+          </a:fillRef>
+          <a:effectRef idx="0">
+            <a:scrgbClr r="0" g="0" b="0"/>
+          </a:effectRef>
+          <a:fontRef idx="minor">
+            <a:schemeClr val="dk1"/>
+          </a:fontRef>
+        </p:style>
+        <p:txBody>
+          <a:bodyPr rtlCol="0" anchor="ctr"/>
+          <a:lstStyle/>
+          <a:p>
+            <a:r>
+              <a:rPr lang="en-US" sz="1400" dirty="0"/>
+              <a:t>The model parameters have already been calculated and stored, there is not need to calculate them again.</a:t>
+            </a:r>
+          </a:p>
+        </p:txBody>
+      </p:sp>
+      <p:sp>
+        <p:nvSpPr>
+          <p:cNvPr id="95" name="Rectangle 94">
+            <a:extLst>
+              <a:ext uri="{FF2B5EF4-FFF2-40B4-BE49-F238E27FC236}">
+                <a16:creationId xmlns:a16="http://schemas.microsoft.com/office/drawing/2014/main" id="{427A952C-6515-4A8F-A5E3-AED1524B34E1}"/>
+              </a:ext>
+            </a:extLst>
+          </p:cNvPr>
+          <p:cNvSpPr/>
+          <p:nvPr/>
+        </p:nvSpPr>
+        <p:spPr>
+          <a:xfrm>
+            <a:off x="783977" y="5273951"/>
+            <a:ext cx="10004406" cy="252178"/>
+          </a:xfrm>
+          <a:prstGeom prst="rect">
+            <a:avLst/>
+          </a:prstGeom>
+          <a:noFill/>
+          <a:ln>
+            <a:noFill/>
+          </a:ln>
+        </p:spPr>
+        <p:style>
+          <a:lnRef idx="0">
+            <a:scrgbClr r="0" g="0" b="0"/>
+          </a:lnRef>
+          <a:fillRef idx="0">
+            <a:scrgbClr r="0" g="0" b="0"/>
+          </a:fillRef>
+          <a:effectRef idx="0">
+            <a:scrgbClr r="0" g="0" b="0"/>
+          </a:effectRef>
+          <a:fontRef idx="minor">
+            <a:schemeClr val="dk1"/>
+          </a:fontRef>
+        </p:style>
+        <p:txBody>
+          <a:bodyPr rtlCol="0" anchor="ctr"/>
+          <a:lstStyle/>
+          <a:p>
+            <a:r>
+              <a:rPr lang="en-US" sz="1400" dirty="0"/>
+              <a:t>The areas and the results of the scenarios considered in the manuscript are already available in the corresponding folders. </a:t>
+            </a:r>
+          </a:p>
+        </p:txBody>
+      </p:sp>
+      <p:sp>
+        <p:nvSpPr>
+          <p:cNvPr id="97" name="Rectangle 96">
+            <a:extLst>
+              <a:ext uri="{FF2B5EF4-FFF2-40B4-BE49-F238E27FC236}">
+                <a16:creationId xmlns:a16="http://schemas.microsoft.com/office/drawing/2014/main" id="{436E4F56-66EE-4801-882A-90FAF261D760}"/>
+              </a:ext>
+            </a:extLst>
+          </p:cNvPr>
+          <p:cNvSpPr/>
+          <p:nvPr/>
+        </p:nvSpPr>
+        <p:spPr>
+          <a:xfrm>
+            <a:off x="7000975" y="889930"/>
+            <a:ext cx="570725" cy="239417"/>
+          </a:xfrm>
+          <a:prstGeom prst="rect">
+            <a:avLst/>
+          </a:prstGeom>
+          <a:noFill/>
+          <a:ln>
+            <a:noFill/>
+          </a:ln>
+        </p:spPr>
+        <p:style>
+          <a:lnRef idx="0">
+            <a:scrgbClr r="0" g="0" b="0"/>
+          </a:lnRef>
+          <a:fillRef idx="0">
+            <a:scrgbClr r="0" g="0" b="0"/>
+          </a:fillRef>
+          <a:effectRef idx="0">
+            <a:scrgbClr r="0" g="0" b="0"/>
+          </a:effectRef>
+          <a:fontRef idx="minor">
+            <a:schemeClr val="dk1"/>
+          </a:fontRef>
+        </p:style>
+        <p:txBody>
+          <a:bodyPr rtlCol="0" anchor="ctr"/>
+          <a:lstStyle/>
+          <a:p>
+            <a:pPr algn="ctr"/>
+            <a:r>
+              <a:rPr lang="en-US" sz="1400" i="1" dirty="0"/>
+              <a:t>calls</a:t>
+            </a:r>
+          </a:p>
+        </p:txBody>
+      </p:sp>
+      <p:cxnSp>
+        <p:nvCxnSpPr>
+          <p:cNvPr id="99" name="Straight Arrow Connector 98">
+            <a:extLst>
+              <a:ext uri="{FF2B5EF4-FFF2-40B4-BE49-F238E27FC236}">
+                <a16:creationId xmlns:a16="http://schemas.microsoft.com/office/drawing/2014/main" id="{2DC25E42-3F02-40B3-B7B3-27D157E860B6}"/>
+              </a:ext>
+            </a:extLst>
+          </p:cNvPr>
+          <p:cNvCxnSpPr>
+            <a:cxnSpLocks/>
+          </p:cNvCxnSpPr>
+          <p:nvPr/>
+        </p:nvCxnSpPr>
+        <p:spPr>
+          <a:xfrm>
+            <a:off x="8635060" y="3041401"/>
+            <a:ext cx="346287" cy="0"/>
+          </a:xfrm>
+          <a:prstGeom prst="straightConnector1">
+            <a:avLst/>
+          </a:prstGeom>
+          <a:ln>
+            <a:tailEnd type="triangle"/>
+          </a:ln>
+        </p:spPr>
+        <p:style>
+          <a:lnRef idx="1">
+            <a:schemeClr val="dk1"/>
+          </a:lnRef>
+          <a:fillRef idx="0">
+            <a:schemeClr val="dk1"/>
+          </a:fillRef>
+          <a:effectRef idx="0">
+            <a:schemeClr val="dk1"/>
+          </a:effectRef>
+          <a:fontRef idx="minor">
+            <a:schemeClr val="tx1"/>
+          </a:fontRef>
+        </p:style>
+      </p:cxnSp>
     </p:spTree>
     <p:extLst>
       <p:ext uri="{BB962C8B-B14F-4D97-AF65-F5344CB8AC3E}">

</xml_diff>